<commit_message>
update Fig. 5 full with new scenario name
</commit_message>
<xml_diff>
--- a/ANALYSIS/figures/fig_5_full.pptx
+++ b/ANALYSIS/figures/fig_5_full.pptx
@@ -106,7 +106,7 @@
   </p:defaultTextStyle>
   <p:extLst>
     <p:ext uri="{EFAFB233-063F-42B5-8137-9DF3F51BA10A}">
-      <p15:sldGuideLst xmlns:p15="http://schemas.microsoft.com/office/powerpoint/2012/main" xmlns="">
+      <p15:sldGuideLst xmlns="" xmlns:p15="http://schemas.microsoft.com/office/powerpoint/2012/main">
         <p15:guide id="1" orient="horz" pos="2880">
           <p15:clr>
             <a:srgbClr val="A4A3A4"/>
@@ -304,7 +304,7 @@
           <a:p>
             <a:fld id="{E8D09EAB-4060-4111-A479-2776B0F6FF4F}" type="datetimeFigureOut">
               <a:rPr lang="en-GB" smtClean="0"/>
-              <a:t>31/05/2021</a:t>
+              <a:t>21/06/2021</a:t>
             </a:fld>
             <a:endParaRPr lang="en-GB"/>
           </a:p>
@@ -346,7 +346,7 @@
           <a:p>
             <a:fld id="{0559B5B1-E84A-4FEF-BA4C-4AA6CD2C3019}" type="slidenum">
               <a:rPr lang="en-GB" smtClean="0"/>
-              <a:t>‹#›</a:t>
+              <a:t>‹Nr.›</a:t>
             </a:fld>
             <a:endParaRPr lang="en-GB"/>
           </a:p>
@@ -474,7 +474,7 @@
           <a:p>
             <a:fld id="{E8D09EAB-4060-4111-A479-2776B0F6FF4F}" type="datetimeFigureOut">
               <a:rPr lang="en-GB" smtClean="0"/>
-              <a:t>31/05/2021</a:t>
+              <a:t>21/06/2021</a:t>
             </a:fld>
             <a:endParaRPr lang="en-GB"/>
           </a:p>
@@ -516,7 +516,7 @@
           <a:p>
             <a:fld id="{0559B5B1-E84A-4FEF-BA4C-4AA6CD2C3019}" type="slidenum">
               <a:rPr lang="en-GB" smtClean="0"/>
-              <a:t>‹#›</a:t>
+              <a:t>‹Nr.›</a:t>
             </a:fld>
             <a:endParaRPr lang="en-GB"/>
           </a:p>
@@ -654,7 +654,7 @@
           <a:p>
             <a:fld id="{E8D09EAB-4060-4111-A479-2776B0F6FF4F}" type="datetimeFigureOut">
               <a:rPr lang="en-GB" smtClean="0"/>
-              <a:t>31/05/2021</a:t>
+              <a:t>21/06/2021</a:t>
             </a:fld>
             <a:endParaRPr lang="en-GB"/>
           </a:p>
@@ -696,7 +696,7 @@
           <a:p>
             <a:fld id="{0559B5B1-E84A-4FEF-BA4C-4AA6CD2C3019}" type="slidenum">
               <a:rPr lang="en-GB" smtClean="0"/>
-              <a:t>‹#›</a:t>
+              <a:t>‹Nr.›</a:t>
             </a:fld>
             <a:endParaRPr lang="en-GB"/>
           </a:p>
@@ -824,7 +824,7 @@
           <a:p>
             <a:fld id="{E8D09EAB-4060-4111-A479-2776B0F6FF4F}" type="datetimeFigureOut">
               <a:rPr lang="en-GB" smtClean="0"/>
-              <a:t>31/05/2021</a:t>
+              <a:t>21/06/2021</a:t>
             </a:fld>
             <a:endParaRPr lang="en-GB"/>
           </a:p>
@@ -866,7 +866,7 @@
           <a:p>
             <a:fld id="{0559B5B1-E84A-4FEF-BA4C-4AA6CD2C3019}" type="slidenum">
               <a:rPr lang="en-GB" smtClean="0"/>
-              <a:t>‹#›</a:t>
+              <a:t>‹Nr.›</a:t>
             </a:fld>
             <a:endParaRPr lang="en-GB"/>
           </a:p>
@@ -1070,7 +1070,7 @@
           <a:p>
             <a:fld id="{E8D09EAB-4060-4111-A479-2776B0F6FF4F}" type="datetimeFigureOut">
               <a:rPr lang="en-GB" smtClean="0"/>
-              <a:t>31/05/2021</a:t>
+              <a:t>21/06/2021</a:t>
             </a:fld>
             <a:endParaRPr lang="en-GB"/>
           </a:p>
@@ -1112,7 +1112,7 @@
           <a:p>
             <a:fld id="{0559B5B1-E84A-4FEF-BA4C-4AA6CD2C3019}" type="slidenum">
               <a:rPr lang="en-GB" smtClean="0"/>
-              <a:t>‹#›</a:t>
+              <a:t>‹Nr.›</a:t>
             </a:fld>
             <a:endParaRPr lang="en-GB"/>
           </a:p>
@@ -1358,7 +1358,7 @@
           <a:p>
             <a:fld id="{E8D09EAB-4060-4111-A479-2776B0F6FF4F}" type="datetimeFigureOut">
               <a:rPr lang="en-GB" smtClean="0"/>
-              <a:t>31/05/2021</a:t>
+              <a:t>21/06/2021</a:t>
             </a:fld>
             <a:endParaRPr lang="en-GB"/>
           </a:p>
@@ -1400,7 +1400,7 @@
           <a:p>
             <a:fld id="{0559B5B1-E84A-4FEF-BA4C-4AA6CD2C3019}" type="slidenum">
               <a:rPr lang="en-GB" smtClean="0"/>
-              <a:t>‹#›</a:t>
+              <a:t>‹Nr.›</a:t>
             </a:fld>
             <a:endParaRPr lang="en-GB"/>
           </a:p>
@@ -1780,7 +1780,7 @@
           <a:p>
             <a:fld id="{E8D09EAB-4060-4111-A479-2776B0F6FF4F}" type="datetimeFigureOut">
               <a:rPr lang="en-GB" smtClean="0"/>
-              <a:t>31/05/2021</a:t>
+              <a:t>21/06/2021</a:t>
             </a:fld>
             <a:endParaRPr lang="en-GB"/>
           </a:p>
@@ -1822,7 +1822,7 @@
           <a:p>
             <a:fld id="{0559B5B1-E84A-4FEF-BA4C-4AA6CD2C3019}" type="slidenum">
               <a:rPr lang="en-GB" smtClean="0"/>
-              <a:t>‹#›</a:t>
+              <a:t>‹Nr.›</a:t>
             </a:fld>
             <a:endParaRPr lang="en-GB"/>
           </a:p>
@@ -1898,7 +1898,7 @@
           <a:p>
             <a:fld id="{E8D09EAB-4060-4111-A479-2776B0F6FF4F}" type="datetimeFigureOut">
               <a:rPr lang="en-GB" smtClean="0"/>
-              <a:t>31/05/2021</a:t>
+              <a:t>21/06/2021</a:t>
             </a:fld>
             <a:endParaRPr lang="en-GB"/>
           </a:p>
@@ -1940,7 +1940,7 @@
           <a:p>
             <a:fld id="{0559B5B1-E84A-4FEF-BA4C-4AA6CD2C3019}" type="slidenum">
               <a:rPr lang="en-GB" smtClean="0"/>
-              <a:t>‹#›</a:t>
+              <a:t>‹Nr.›</a:t>
             </a:fld>
             <a:endParaRPr lang="en-GB"/>
           </a:p>
@@ -1993,7 +1993,7 @@
           <a:p>
             <a:fld id="{E8D09EAB-4060-4111-A479-2776B0F6FF4F}" type="datetimeFigureOut">
               <a:rPr lang="en-GB" smtClean="0"/>
-              <a:t>31/05/2021</a:t>
+              <a:t>21/06/2021</a:t>
             </a:fld>
             <a:endParaRPr lang="en-GB"/>
           </a:p>
@@ -2035,7 +2035,7 @@
           <a:p>
             <a:fld id="{0559B5B1-E84A-4FEF-BA4C-4AA6CD2C3019}" type="slidenum">
               <a:rPr lang="en-GB" smtClean="0"/>
-              <a:t>‹#›</a:t>
+              <a:t>‹Nr.›</a:t>
             </a:fld>
             <a:endParaRPr lang="en-GB"/>
           </a:p>
@@ -2270,7 +2270,7 @@
           <a:p>
             <a:fld id="{E8D09EAB-4060-4111-A479-2776B0F6FF4F}" type="datetimeFigureOut">
               <a:rPr lang="en-GB" smtClean="0"/>
-              <a:t>31/05/2021</a:t>
+              <a:t>21/06/2021</a:t>
             </a:fld>
             <a:endParaRPr lang="en-GB"/>
           </a:p>
@@ -2312,7 +2312,7 @@
           <a:p>
             <a:fld id="{0559B5B1-E84A-4FEF-BA4C-4AA6CD2C3019}" type="slidenum">
               <a:rPr lang="en-GB" smtClean="0"/>
-              <a:t>‹#›</a:t>
+              <a:t>‹Nr.›</a:t>
             </a:fld>
             <a:endParaRPr lang="en-GB"/>
           </a:p>
@@ -2523,7 +2523,7 @@
           <a:p>
             <a:fld id="{E8D09EAB-4060-4111-A479-2776B0F6FF4F}" type="datetimeFigureOut">
               <a:rPr lang="en-GB" smtClean="0"/>
-              <a:t>31/05/2021</a:t>
+              <a:t>21/06/2021</a:t>
             </a:fld>
             <a:endParaRPr lang="en-GB"/>
           </a:p>
@@ -2565,7 +2565,7 @@
           <a:p>
             <a:fld id="{0559B5B1-E84A-4FEF-BA4C-4AA6CD2C3019}" type="slidenum">
               <a:rPr lang="en-GB" smtClean="0"/>
-              <a:t>‹#›</a:t>
+              <a:t>‹Nr.›</a:t>
             </a:fld>
             <a:endParaRPr lang="en-GB"/>
           </a:p>
@@ -2736,7 +2736,7 @@
           <a:p>
             <a:fld id="{E8D09EAB-4060-4111-A479-2776B0F6FF4F}" type="datetimeFigureOut">
               <a:rPr lang="en-GB" smtClean="0"/>
-              <a:t>31/05/2021</a:t>
+              <a:t>21/06/2021</a:t>
             </a:fld>
             <a:endParaRPr lang="en-GB"/>
           </a:p>
@@ -2814,7 +2814,7 @@
           <a:p>
             <a:fld id="{0559B5B1-E84A-4FEF-BA4C-4AA6CD2C3019}" type="slidenum">
               <a:rPr lang="en-GB" smtClean="0"/>
-              <a:t>‹#›</a:t>
+              <a:t>‹Nr.›</a:t>
             </a:fld>
             <a:endParaRPr lang="en-GB"/>
           </a:p>
@@ -3116,7 +3116,7 @@
           <p:cNvPr id="8" name="Picture 7">
             <a:extLst>
               <a:ext uri="{FF2B5EF4-FFF2-40B4-BE49-F238E27FC236}">
-                <a16:creationId xmlns:a16="http://schemas.microsoft.com/office/drawing/2014/main" xmlns="" id="{058DD8F6-E51A-43EF-99E2-9077CAAED9CB}"/>
+                <a16:creationId xmlns="" xmlns:a16="http://schemas.microsoft.com/office/drawing/2014/main" id="{058DD8F6-E51A-43EF-99E2-9077CAAED9CB}"/>
               </a:ext>
             </a:extLst>
           </p:cNvPr>
@@ -3139,8 +3139,8 @@
         </p:blipFill>
         <p:spPr>
           <a:xfrm>
-            <a:off x="42333" y="0"/>
-            <a:ext cx="6773332" cy="9144000"/>
+            <a:off x="42333" y="1"/>
+            <a:ext cx="6773332" cy="9143998"/>
           </a:xfrm>
           <a:prstGeom prst="rect">
             <a:avLst/>
@@ -3196,7 +3196,7 @@
           <p:cNvPr id="3" name="Grupo 2">
             <a:extLst>
               <a:ext uri="{FF2B5EF4-FFF2-40B4-BE49-F238E27FC236}">
-                <a16:creationId xmlns:a16="http://schemas.microsoft.com/office/drawing/2014/main" xmlns="" id="{00C8BF69-5819-4ED1-8B1D-39E356B36CE6}"/>
+                <a16:creationId xmlns="" xmlns:a16="http://schemas.microsoft.com/office/drawing/2014/main" id="{00C8BF69-5819-4ED1-8B1D-39E356B36CE6}"/>
               </a:ext>
             </a:extLst>
           </p:cNvPr>
@@ -3219,7 +3219,7 @@
             <p:cNvPr id="2" name="Elipse 1">
               <a:extLst>
                 <a:ext uri="{FF2B5EF4-FFF2-40B4-BE49-F238E27FC236}">
-                  <a16:creationId xmlns:a16="http://schemas.microsoft.com/office/drawing/2014/main" xmlns="" id="{F11868A6-1163-470A-B005-07AC1F516A83}"/>
+                  <a16:creationId xmlns="" xmlns:a16="http://schemas.microsoft.com/office/drawing/2014/main" id="{F11868A6-1163-470A-B005-07AC1F516A83}"/>
                 </a:ext>
               </a:extLst>
             </p:cNvPr>
@@ -3277,7 +3277,7 @@
             <p:cNvPr id="14" name="Elipse 13">
               <a:extLst>
                 <a:ext uri="{FF2B5EF4-FFF2-40B4-BE49-F238E27FC236}">
-                  <a16:creationId xmlns:a16="http://schemas.microsoft.com/office/drawing/2014/main" xmlns="" id="{ADCCF109-F907-44E9-8EA1-4A7C13CA66F1}"/>
+                  <a16:creationId xmlns="" xmlns:a16="http://schemas.microsoft.com/office/drawing/2014/main" id="{ADCCF109-F907-44E9-8EA1-4A7C13CA66F1}"/>
                 </a:ext>
               </a:extLst>
             </p:cNvPr>
@@ -3336,7 +3336,7 @@
           <p:cNvPr id="15" name="Grupo 14">
             <a:extLst>
               <a:ext uri="{FF2B5EF4-FFF2-40B4-BE49-F238E27FC236}">
-                <a16:creationId xmlns:a16="http://schemas.microsoft.com/office/drawing/2014/main" xmlns="" id="{53919B86-4538-4125-9AED-E190957C0041}"/>
+                <a16:creationId xmlns="" xmlns:a16="http://schemas.microsoft.com/office/drawing/2014/main" id="{53919B86-4538-4125-9AED-E190957C0041}"/>
               </a:ext>
             </a:extLst>
           </p:cNvPr>
@@ -3359,7 +3359,7 @@
             <p:cNvPr id="16" name="Elipse 15">
               <a:extLst>
                 <a:ext uri="{FF2B5EF4-FFF2-40B4-BE49-F238E27FC236}">
-                  <a16:creationId xmlns:a16="http://schemas.microsoft.com/office/drawing/2014/main" xmlns="" id="{FCBF0843-0DBB-4757-A582-096E4AFFE6F8}"/>
+                  <a16:creationId xmlns="" xmlns:a16="http://schemas.microsoft.com/office/drawing/2014/main" id="{FCBF0843-0DBB-4757-A582-096E4AFFE6F8}"/>
                 </a:ext>
               </a:extLst>
             </p:cNvPr>
@@ -3417,7 +3417,7 @@
             <p:cNvPr id="17" name="Elipse 16">
               <a:extLst>
                 <a:ext uri="{FF2B5EF4-FFF2-40B4-BE49-F238E27FC236}">
-                  <a16:creationId xmlns:a16="http://schemas.microsoft.com/office/drawing/2014/main" xmlns="" id="{3E871422-F211-4955-88EF-51D5EE4B2353}"/>
+                  <a16:creationId xmlns="" xmlns:a16="http://schemas.microsoft.com/office/drawing/2014/main" id="{3E871422-F211-4955-88EF-51D5EE4B2353}"/>
                 </a:ext>
               </a:extLst>
             </p:cNvPr>
@@ -3476,7 +3476,7 @@
           <p:cNvPr id="18" name="Grupo 17">
             <a:extLst>
               <a:ext uri="{FF2B5EF4-FFF2-40B4-BE49-F238E27FC236}">
-                <a16:creationId xmlns:a16="http://schemas.microsoft.com/office/drawing/2014/main" xmlns="" id="{B92ED89A-82C3-4803-A064-48FC0D13940B}"/>
+                <a16:creationId xmlns="" xmlns:a16="http://schemas.microsoft.com/office/drawing/2014/main" id="{B92ED89A-82C3-4803-A064-48FC0D13940B}"/>
               </a:ext>
             </a:extLst>
           </p:cNvPr>
@@ -3499,7 +3499,7 @@
             <p:cNvPr id="19" name="Elipse 18">
               <a:extLst>
                 <a:ext uri="{FF2B5EF4-FFF2-40B4-BE49-F238E27FC236}">
-                  <a16:creationId xmlns:a16="http://schemas.microsoft.com/office/drawing/2014/main" xmlns="" id="{FCE575FB-645E-45C0-9CC3-50DBD7F73521}"/>
+                  <a16:creationId xmlns="" xmlns:a16="http://schemas.microsoft.com/office/drawing/2014/main" id="{FCE575FB-645E-45C0-9CC3-50DBD7F73521}"/>
                 </a:ext>
               </a:extLst>
             </p:cNvPr>
@@ -3557,7 +3557,7 @@
             <p:cNvPr id="20" name="Elipse 19">
               <a:extLst>
                 <a:ext uri="{FF2B5EF4-FFF2-40B4-BE49-F238E27FC236}">
-                  <a16:creationId xmlns:a16="http://schemas.microsoft.com/office/drawing/2014/main" xmlns="" id="{1C7A9EE1-D1A6-4065-B8AF-CBCF0181B45B}"/>
+                  <a16:creationId xmlns="" xmlns:a16="http://schemas.microsoft.com/office/drawing/2014/main" id="{1C7A9EE1-D1A6-4065-B8AF-CBCF0181B45B}"/>
                 </a:ext>
               </a:extLst>
             </p:cNvPr>
@@ -3616,7 +3616,7 @@
           <p:cNvPr id="21" name="Grupo 20">
             <a:extLst>
               <a:ext uri="{FF2B5EF4-FFF2-40B4-BE49-F238E27FC236}">
-                <a16:creationId xmlns:a16="http://schemas.microsoft.com/office/drawing/2014/main" xmlns="" id="{C7F6523B-C331-4B25-9B53-727850478324}"/>
+                <a16:creationId xmlns="" xmlns:a16="http://schemas.microsoft.com/office/drawing/2014/main" id="{C7F6523B-C331-4B25-9B53-727850478324}"/>
               </a:ext>
             </a:extLst>
           </p:cNvPr>
@@ -3642,7 +3642,7 @@
             <p:cNvPr id="22" name="Elipse 21">
               <a:extLst>
                 <a:ext uri="{FF2B5EF4-FFF2-40B4-BE49-F238E27FC236}">
-                  <a16:creationId xmlns:a16="http://schemas.microsoft.com/office/drawing/2014/main" xmlns="" id="{EABB8D31-B42D-402A-A30A-297421DE9AA3}"/>
+                  <a16:creationId xmlns="" xmlns:a16="http://schemas.microsoft.com/office/drawing/2014/main" id="{EABB8D31-B42D-402A-A30A-297421DE9AA3}"/>
                 </a:ext>
               </a:extLst>
             </p:cNvPr>
@@ -3700,7 +3700,7 @@
             <p:cNvPr id="23" name="Elipse 22">
               <a:extLst>
                 <a:ext uri="{FF2B5EF4-FFF2-40B4-BE49-F238E27FC236}">
-                  <a16:creationId xmlns:a16="http://schemas.microsoft.com/office/drawing/2014/main" xmlns="" id="{98E7076B-CF16-4D04-AB70-36053E6B338F}"/>
+                  <a16:creationId xmlns="" xmlns:a16="http://schemas.microsoft.com/office/drawing/2014/main" id="{98E7076B-CF16-4D04-AB70-36053E6B338F}"/>
                 </a:ext>
               </a:extLst>
             </p:cNvPr>
@@ -3759,7 +3759,7 @@
           <p:cNvPr id="24" name="Grupo 23">
             <a:extLst>
               <a:ext uri="{FF2B5EF4-FFF2-40B4-BE49-F238E27FC236}">
-                <a16:creationId xmlns:a16="http://schemas.microsoft.com/office/drawing/2014/main" xmlns="" id="{C718B281-0380-4010-9E94-1B06761560E5}"/>
+                <a16:creationId xmlns="" xmlns:a16="http://schemas.microsoft.com/office/drawing/2014/main" id="{C718B281-0380-4010-9E94-1B06761560E5}"/>
               </a:ext>
             </a:extLst>
           </p:cNvPr>
@@ -3785,7 +3785,7 @@
             <p:cNvPr id="25" name="Elipse 24">
               <a:extLst>
                 <a:ext uri="{FF2B5EF4-FFF2-40B4-BE49-F238E27FC236}">
-                  <a16:creationId xmlns:a16="http://schemas.microsoft.com/office/drawing/2014/main" xmlns="" id="{B1FC7590-7BC3-4618-AF3D-6B96DB58A74E}"/>
+                  <a16:creationId xmlns="" xmlns:a16="http://schemas.microsoft.com/office/drawing/2014/main" id="{B1FC7590-7BC3-4618-AF3D-6B96DB58A74E}"/>
                 </a:ext>
               </a:extLst>
             </p:cNvPr>
@@ -3843,7 +3843,7 @@
             <p:cNvPr id="26" name="Elipse 25">
               <a:extLst>
                 <a:ext uri="{FF2B5EF4-FFF2-40B4-BE49-F238E27FC236}">
-                  <a16:creationId xmlns:a16="http://schemas.microsoft.com/office/drawing/2014/main" xmlns="" id="{B0AF3667-BD2B-4570-B0AB-4A8E10617ACE}"/>
+                  <a16:creationId xmlns="" xmlns:a16="http://schemas.microsoft.com/office/drawing/2014/main" id="{B0AF3667-BD2B-4570-B0AB-4A8E10617ACE}"/>
                 </a:ext>
               </a:extLst>
             </p:cNvPr>
@@ -3902,7 +3902,7 @@
           <p:cNvPr id="4" name="CuadroTexto 3">
             <a:extLst>
               <a:ext uri="{FF2B5EF4-FFF2-40B4-BE49-F238E27FC236}">
-                <a16:creationId xmlns:a16="http://schemas.microsoft.com/office/drawing/2014/main" xmlns="" id="{2C065924-AFCD-41BD-BABA-49AB570FB839}"/>
+                <a16:creationId xmlns="" xmlns:a16="http://schemas.microsoft.com/office/drawing/2014/main" id="{2C065924-AFCD-41BD-BABA-49AB570FB839}"/>
               </a:ext>
             </a:extLst>
           </p:cNvPr>
@@ -3944,7 +3944,7 @@
           <p:cNvPr id="27" name="CuadroTexto 26">
             <a:extLst>
               <a:ext uri="{FF2B5EF4-FFF2-40B4-BE49-F238E27FC236}">
-                <a16:creationId xmlns:a16="http://schemas.microsoft.com/office/drawing/2014/main" xmlns="" id="{C9F9865D-DCC2-4D25-A649-492D7CEB2558}"/>
+                <a16:creationId xmlns="" xmlns:a16="http://schemas.microsoft.com/office/drawing/2014/main" id="{C9F9865D-DCC2-4D25-A649-492D7CEB2558}"/>
               </a:ext>
             </a:extLst>
           </p:cNvPr>
@@ -3986,7 +3986,7 @@
           <p:cNvPr id="28" name="CuadroTexto 27">
             <a:extLst>
               <a:ext uri="{FF2B5EF4-FFF2-40B4-BE49-F238E27FC236}">
-                <a16:creationId xmlns:a16="http://schemas.microsoft.com/office/drawing/2014/main" xmlns="" id="{306FBF48-C46C-4AC2-92B3-582363311113}"/>
+                <a16:creationId xmlns="" xmlns:a16="http://schemas.microsoft.com/office/drawing/2014/main" id="{306FBF48-C46C-4AC2-92B3-582363311113}"/>
               </a:ext>
             </a:extLst>
           </p:cNvPr>
@@ -4028,7 +4028,7 @@
           <p:cNvPr id="29" name="CuadroTexto 28">
             <a:extLst>
               <a:ext uri="{FF2B5EF4-FFF2-40B4-BE49-F238E27FC236}">
-                <a16:creationId xmlns:a16="http://schemas.microsoft.com/office/drawing/2014/main" xmlns="" id="{1C2EBE88-01F7-43AF-8FF0-66ED221503FE}"/>
+                <a16:creationId xmlns="" xmlns:a16="http://schemas.microsoft.com/office/drawing/2014/main" id="{1C2EBE88-01F7-43AF-8FF0-66ED221503FE}"/>
               </a:ext>
             </a:extLst>
           </p:cNvPr>
@@ -4070,7 +4070,7 @@
           <p:cNvPr id="30" name="CuadroTexto 29">
             <a:extLst>
               <a:ext uri="{FF2B5EF4-FFF2-40B4-BE49-F238E27FC236}">
-                <a16:creationId xmlns:a16="http://schemas.microsoft.com/office/drawing/2014/main" xmlns="" id="{D5D51A3B-C4B4-4882-BAA3-A20640E48FD5}"/>
+                <a16:creationId xmlns="" xmlns:a16="http://schemas.microsoft.com/office/drawing/2014/main" id="{D5D51A3B-C4B4-4882-BAA3-A20640E48FD5}"/>
               </a:ext>
             </a:extLst>
           </p:cNvPr>
@@ -4112,7 +4112,7 @@
           <p:cNvPr id="31" name="CuadroTexto 30">
             <a:extLst>
               <a:ext uri="{FF2B5EF4-FFF2-40B4-BE49-F238E27FC236}">
-                <a16:creationId xmlns:a16="http://schemas.microsoft.com/office/drawing/2014/main" xmlns="" id="{6BB7164B-09FF-4735-8E9C-B6B7AFDCEEAD}"/>
+                <a16:creationId xmlns="" xmlns:a16="http://schemas.microsoft.com/office/drawing/2014/main" id="{6BB7164B-09FF-4735-8E9C-B6B7AFDCEEAD}"/>
               </a:ext>
             </a:extLst>
           </p:cNvPr>
@@ -4154,7 +4154,7 @@
           <p:cNvPr id="32" name="CuadroTexto 31">
             <a:extLst>
               <a:ext uri="{FF2B5EF4-FFF2-40B4-BE49-F238E27FC236}">
-                <a16:creationId xmlns:a16="http://schemas.microsoft.com/office/drawing/2014/main" xmlns="" id="{929F0A8C-E928-4D4B-AFB2-32017935F4F5}"/>
+                <a16:creationId xmlns="" xmlns:a16="http://schemas.microsoft.com/office/drawing/2014/main" id="{929F0A8C-E928-4D4B-AFB2-32017935F4F5}"/>
               </a:ext>
             </a:extLst>
           </p:cNvPr>
@@ -4196,7 +4196,7 @@
           <p:cNvPr id="33" name="CuadroTexto 32">
             <a:extLst>
               <a:ext uri="{FF2B5EF4-FFF2-40B4-BE49-F238E27FC236}">
-                <a16:creationId xmlns:a16="http://schemas.microsoft.com/office/drawing/2014/main" xmlns="" id="{6A3563C1-8D96-442E-A239-59738743CB2A}"/>
+                <a16:creationId xmlns="" xmlns:a16="http://schemas.microsoft.com/office/drawing/2014/main" id="{6A3563C1-8D96-442E-A239-59738743CB2A}"/>
               </a:ext>
             </a:extLst>
           </p:cNvPr>
@@ -4238,7 +4238,7 @@
           <p:cNvPr id="34" name="CuadroTexto 33">
             <a:extLst>
               <a:ext uri="{FF2B5EF4-FFF2-40B4-BE49-F238E27FC236}">
-                <a16:creationId xmlns:a16="http://schemas.microsoft.com/office/drawing/2014/main" xmlns="" id="{BC94AD27-5C1A-4031-8691-7BBF5ED4AE95}"/>
+                <a16:creationId xmlns="" xmlns:a16="http://schemas.microsoft.com/office/drawing/2014/main" id="{BC94AD27-5C1A-4031-8691-7BBF5ED4AE95}"/>
               </a:ext>
             </a:extLst>
           </p:cNvPr>
@@ -4280,7 +4280,7 @@
           <p:cNvPr id="35" name="CuadroTexto 34">
             <a:extLst>
               <a:ext uri="{FF2B5EF4-FFF2-40B4-BE49-F238E27FC236}">
-                <a16:creationId xmlns:a16="http://schemas.microsoft.com/office/drawing/2014/main" xmlns="" id="{088D0F7F-F407-4CF9-8096-61EFC9362002}"/>
+                <a16:creationId xmlns="" xmlns:a16="http://schemas.microsoft.com/office/drawing/2014/main" id="{088D0F7F-F407-4CF9-8096-61EFC9362002}"/>
               </a:ext>
             </a:extLst>
           </p:cNvPr>
@@ -4322,7 +4322,7 @@
           <p:cNvPr id="36" name="CuadroTexto 35">
             <a:extLst>
               <a:ext uri="{FF2B5EF4-FFF2-40B4-BE49-F238E27FC236}">
-                <a16:creationId xmlns:a16="http://schemas.microsoft.com/office/drawing/2014/main" xmlns="" id="{94E623A8-BF5E-464F-BD23-B945E7EA7406}"/>
+                <a16:creationId xmlns="" xmlns:a16="http://schemas.microsoft.com/office/drawing/2014/main" id="{94E623A8-BF5E-464F-BD23-B945E7EA7406}"/>
               </a:ext>
             </a:extLst>
           </p:cNvPr>
@@ -4364,7 +4364,7 @@
           <p:cNvPr id="37" name="CuadroTexto 36">
             <a:extLst>
               <a:ext uri="{FF2B5EF4-FFF2-40B4-BE49-F238E27FC236}">
-                <a16:creationId xmlns:a16="http://schemas.microsoft.com/office/drawing/2014/main" xmlns="" id="{7961C6B0-0BA2-45AC-A9FE-2FC0966D5F6A}"/>
+                <a16:creationId xmlns="" xmlns:a16="http://schemas.microsoft.com/office/drawing/2014/main" id="{7961C6B0-0BA2-45AC-A9FE-2FC0966D5F6A}"/>
               </a:ext>
             </a:extLst>
           </p:cNvPr>
@@ -4406,7 +4406,7 @@
           <p:cNvPr id="38" name="CuadroTexto 37">
             <a:extLst>
               <a:ext uri="{FF2B5EF4-FFF2-40B4-BE49-F238E27FC236}">
-                <a16:creationId xmlns:a16="http://schemas.microsoft.com/office/drawing/2014/main" xmlns="" id="{9158EB16-FDDD-4921-ACE1-A6C2B6F87586}"/>
+                <a16:creationId xmlns="" xmlns:a16="http://schemas.microsoft.com/office/drawing/2014/main" id="{9158EB16-FDDD-4921-ACE1-A6C2B6F87586}"/>
               </a:ext>
             </a:extLst>
           </p:cNvPr>
@@ -4448,7 +4448,7 @@
           <p:cNvPr id="45" name="CuadroTexto 44">
             <a:extLst>
               <a:ext uri="{FF2B5EF4-FFF2-40B4-BE49-F238E27FC236}">
-                <a16:creationId xmlns:a16="http://schemas.microsoft.com/office/drawing/2014/main" xmlns="" id="{64F497A2-A74F-471B-B8E0-5F065BABE760}"/>
+                <a16:creationId xmlns="" xmlns:a16="http://schemas.microsoft.com/office/drawing/2014/main" id="{64F497A2-A74F-471B-B8E0-5F065BABE760}"/>
               </a:ext>
             </a:extLst>
           </p:cNvPr>
@@ -4490,7 +4490,7 @@
           <p:cNvPr id="46" name="CuadroTexto 45">
             <a:extLst>
               <a:ext uri="{FF2B5EF4-FFF2-40B4-BE49-F238E27FC236}">
-                <a16:creationId xmlns:a16="http://schemas.microsoft.com/office/drawing/2014/main" xmlns="" id="{F8805926-2957-4D54-A9D3-6520BDFD0590}"/>
+                <a16:creationId xmlns="" xmlns:a16="http://schemas.microsoft.com/office/drawing/2014/main" id="{F8805926-2957-4D54-A9D3-6520BDFD0590}"/>
               </a:ext>
             </a:extLst>
           </p:cNvPr>
@@ -4532,7 +4532,7 @@
           <p:cNvPr id="47" name="CuadroTexto 46">
             <a:extLst>
               <a:ext uri="{FF2B5EF4-FFF2-40B4-BE49-F238E27FC236}">
-                <a16:creationId xmlns:a16="http://schemas.microsoft.com/office/drawing/2014/main" xmlns="" id="{464311D1-ACE2-4720-958B-C72B2DCC963C}"/>
+                <a16:creationId xmlns="" xmlns:a16="http://schemas.microsoft.com/office/drawing/2014/main" id="{464311D1-ACE2-4720-958B-C72B2DCC963C}"/>
               </a:ext>
             </a:extLst>
           </p:cNvPr>
@@ -4574,7 +4574,7 @@
           <p:cNvPr id="48" name="CuadroTexto 47">
             <a:extLst>
               <a:ext uri="{FF2B5EF4-FFF2-40B4-BE49-F238E27FC236}">
-                <a16:creationId xmlns:a16="http://schemas.microsoft.com/office/drawing/2014/main" xmlns="" id="{7739AEF0-D1AA-490F-9131-D44DE0FA221B}"/>
+                <a16:creationId xmlns="" xmlns:a16="http://schemas.microsoft.com/office/drawing/2014/main" id="{7739AEF0-D1AA-490F-9131-D44DE0FA221B}"/>
               </a:ext>
             </a:extLst>
           </p:cNvPr>
@@ -4612,7 +4612,7 @@
           <p:cNvPr id="49" name="CuadroTexto 48">
             <a:extLst>
               <a:ext uri="{FF2B5EF4-FFF2-40B4-BE49-F238E27FC236}">
-                <a16:creationId xmlns:a16="http://schemas.microsoft.com/office/drawing/2014/main" xmlns="" id="{37A34C75-2635-4809-999D-CD8272FC0B0E}"/>
+                <a16:creationId xmlns="" xmlns:a16="http://schemas.microsoft.com/office/drawing/2014/main" id="{37A34C75-2635-4809-999D-CD8272FC0B0E}"/>
               </a:ext>
             </a:extLst>
           </p:cNvPr>
@@ -4654,7 +4654,7 @@
           <p:cNvPr id="50" name="CuadroTexto 49">
             <a:extLst>
               <a:ext uri="{FF2B5EF4-FFF2-40B4-BE49-F238E27FC236}">
-                <a16:creationId xmlns:a16="http://schemas.microsoft.com/office/drawing/2014/main" xmlns="" id="{0D75D048-7A19-4E8F-832B-0A669FF50525}"/>
+                <a16:creationId xmlns="" xmlns:a16="http://schemas.microsoft.com/office/drawing/2014/main" id="{0D75D048-7A19-4E8F-832B-0A669FF50525}"/>
               </a:ext>
             </a:extLst>
           </p:cNvPr>
@@ -4696,7 +4696,7 @@
           <p:cNvPr id="51" name="CuadroTexto 50">
             <a:extLst>
               <a:ext uri="{FF2B5EF4-FFF2-40B4-BE49-F238E27FC236}">
-                <a16:creationId xmlns:a16="http://schemas.microsoft.com/office/drawing/2014/main" xmlns="" id="{8CFCAABF-9350-491F-A0AA-0EB0B567054B}"/>
+                <a16:creationId xmlns="" xmlns:a16="http://schemas.microsoft.com/office/drawing/2014/main" id="{8CFCAABF-9350-491F-A0AA-0EB0B567054B}"/>
               </a:ext>
             </a:extLst>
           </p:cNvPr>
@@ -4738,7 +4738,7 @@
           <p:cNvPr id="52" name="CuadroTexto 51">
             <a:extLst>
               <a:ext uri="{FF2B5EF4-FFF2-40B4-BE49-F238E27FC236}">
-                <a16:creationId xmlns:a16="http://schemas.microsoft.com/office/drawing/2014/main" xmlns="" id="{2DF05F04-1404-46FA-A017-0E8B3FD72604}"/>
+                <a16:creationId xmlns="" xmlns:a16="http://schemas.microsoft.com/office/drawing/2014/main" id="{2DF05F04-1404-46FA-A017-0E8B3FD72604}"/>
               </a:ext>
             </a:extLst>
           </p:cNvPr>
@@ -4780,7 +4780,7 @@
           <p:cNvPr id="53" name="CuadroTexto 52">
             <a:extLst>
               <a:ext uri="{FF2B5EF4-FFF2-40B4-BE49-F238E27FC236}">
-                <a16:creationId xmlns:a16="http://schemas.microsoft.com/office/drawing/2014/main" xmlns="" id="{B3461E4D-1380-446B-BF01-7623884645C2}"/>
+                <a16:creationId xmlns="" xmlns:a16="http://schemas.microsoft.com/office/drawing/2014/main" id="{B3461E4D-1380-446B-BF01-7623884645C2}"/>
               </a:ext>
             </a:extLst>
           </p:cNvPr>
@@ -4822,7 +4822,7 @@
           <p:cNvPr id="54" name="CuadroTexto 53">
             <a:extLst>
               <a:ext uri="{FF2B5EF4-FFF2-40B4-BE49-F238E27FC236}">
-                <a16:creationId xmlns:a16="http://schemas.microsoft.com/office/drawing/2014/main" xmlns="" id="{07F2331E-447C-4043-B655-E6F57E76183C}"/>
+                <a16:creationId xmlns="" xmlns:a16="http://schemas.microsoft.com/office/drawing/2014/main" id="{07F2331E-447C-4043-B655-E6F57E76183C}"/>
               </a:ext>
             </a:extLst>
           </p:cNvPr>
@@ -4860,7 +4860,7 @@
           <p:cNvPr id="55" name="CuadroTexto 54">
             <a:extLst>
               <a:ext uri="{FF2B5EF4-FFF2-40B4-BE49-F238E27FC236}">
-                <a16:creationId xmlns:a16="http://schemas.microsoft.com/office/drawing/2014/main" xmlns="" id="{C4660CC1-823B-4944-B82A-DF1AC34ED90D}"/>
+                <a16:creationId xmlns="" xmlns:a16="http://schemas.microsoft.com/office/drawing/2014/main" id="{C4660CC1-823B-4944-B82A-DF1AC34ED90D}"/>
               </a:ext>
             </a:extLst>
           </p:cNvPr>
@@ -4902,7 +4902,7 @@
           <p:cNvPr id="56" name="CuadroTexto 55">
             <a:extLst>
               <a:ext uri="{FF2B5EF4-FFF2-40B4-BE49-F238E27FC236}">
-                <a16:creationId xmlns:a16="http://schemas.microsoft.com/office/drawing/2014/main" xmlns="" id="{631941B6-84F2-4F8E-B977-AAF603C81477}"/>
+                <a16:creationId xmlns="" xmlns:a16="http://schemas.microsoft.com/office/drawing/2014/main" id="{631941B6-84F2-4F8E-B977-AAF603C81477}"/>
               </a:ext>
             </a:extLst>
           </p:cNvPr>
@@ -4944,7 +4944,7 @@
           <p:cNvPr id="60" name="CuadroTexto 59">
             <a:extLst>
               <a:ext uri="{FF2B5EF4-FFF2-40B4-BE49-F238E27FC236}">
-                <a16:creationId xmlns:a16="http://schemas.microsoft.com/office/drawing/2014/main" xmlns="" id="{EF491285-9C96-4DC7-B86B-11DC2A5C63AD}"/>
+                <a16:creationId xmlns="" xmlns:a16="http://schemas.microsoft.com/office/drawing/2014/main" id="{EF491285-9C96-4DC7-B86B-11DC2A5C63AD}"/>
               </a:ext>
             </a:extLst>
           </p:cNvPr>
@@ -4982,7 +4982,7 @@
           <p:cNvPr id="61" name="CuadroTexto 60">
             <a:extLst>
               <a:ext uri="{FF2B5EF4-FFF2-40B4-BE49-F238E27FC236}">
-                <a16:creationId xmlns:a16="http://schemas.microsoft.com/office/drawing/2014/main" xmlns="" id="{EFDECC65-CF47-43BF-AB78-EBDF3C592C38}"/>
+                <a16:creationId xmlns="" xmlns:a16="http://schemas.microsoft.com/office/drawing/2014/main" id="{EFDECC65-CF47-43BF-AB78-EBDF3C592C38}"/>
               </a:ext>
             </a:extLst>
           </p:cNvPr>
@@ -5024,7 +5024,7 @@
           <p:cNvPr id="62" name="CuadroTexto 61">
             <a:extLst>
               <a:ext uri="{FF2B5EF4-FFF2-40B4-BE49-F238E27FC236}">
-                <a16:creationId xmlns:a16="http://schemas.microsoft.com/office/drawing/2014/main" xmlns="" id="{A48BE513-E1CA-4FF9-8E76-E4E654A09BCA}"/>
+                <a16:creationId xmlns="" xmlns:a16="http://schemas.microsoft.com/office/drawing/2014/main" id="{A48BE513-E1CA-4FF9-8E76-E4E654A09BCA}"/>
               </a:ext>
             </a:extLst>
           </p:cNvPr>
@@ -5066,7 +5066,7 @@
           <p:cNvPr id="63" name="CuadroTexto 62">
             <a:extLst>
               <a:ext uri="{FF2B5EF4-FFF2-40B4-BE49-F238E27FC236}">
-                <a16:creationId xmlns:a16="http://schemas.microsoft.com/office/drawing/2014/main" xmlns="" id="{B5F3F6FC-3B25-4FE4-9F57-CCC2C803C887}"/>
+                <a16:creationId xmlns="" xmlns:a16="http://schemas.microsoft.com/office/drawing/2014/main" id="{B5F3F6FC-3B25-4FE4-9F57-CCC2C803C887}"/>
               </a:ext>
             </a:extLst>
           </p:cNvPr>
@@ -5108,7 +5108,7 @@
           <p:cNvPr id="64" name="CuadroTexto 63">
             <a:extLst>
               <a:ext uri="{FF2B5EF4-FFF2-40B4-BE49-F238E27FC236}">
-                <a16:creationId xmlns:a16="http://schemas.microsoft.com/office/drawing/2014/main" xmlns="" id="{BB977EB0-971D-49A2-B53E-76491C16FF19}"/>
+                <a16:creationId xmlns="" xmlns:a16="http://schemas.microsoft.com/office/drawing/2014/main" id="{BB977EB0-971D-49A2-B53E-76491C16FF19}"/>
               </a:ext>
             </a:extLst>
           </p:cNvPr>
@@ -5150,7 +5150,7 @@
           <p:cNvPr id="65" name="CuadroTexto 64">
             <a:extLst>
               <a:ext uri="{FF2B5EF4-FFF2-40B4-BE49-F238E27FC236}">
-                <a16:creationId xmlns:a16="http://schemas.microsoft.com/office/drawing/2014/main" xmlns="" id="{9BD59094-5074-4068-A400-82558D3C6846}"/>
+                <a16:creationId xmlns="" xmlns:a16="http://schemas.microsoft.com/office/drawing/2014/main" id="{9BD59094-5074-4068-A400-82558D3C6846}"/>
               </a:ext>
             </a:extLst>
           </p:cNvPr>
@@ -5192,7 +5192,7 @@
           <p:cNvPr id="66" name="CuadroTexto 65">
             <a:extLst>
               <a:ext uri="{FF2B5EF4-FFF2-40B4-BE49-F238E27FC236}">
-                <a16:creationId xmlns:a16="http://schemas.microsoft.com/office/drawing/2014/main" xmlns="" id="{5C502544-7907-4664-9618-298B9F6D21C5}"/>
+                <a16:creationId xmlns="" xmlns:a16="http://schemas.microsoft.com/office/drawing/2014/main" id="{5C502544-7907-4664-9618-298B9F6D21C5}"/>
               </a:ext>
             </a:extLst>
           </p:cNvPr>
@@ -5234,7 +5234,7 @@
           <p:cNvPr id="67" name="CuadroTexto 66">
             <a:extLst>
               <a:ext uri="{FF2B5EF4-FFF2-40B4-BE49-F238E27FC236}">
-                <a16:creationId xmlns:a16="http://schemas.microsoft.com/office/drawing/2014/main" xmlns="" id="{907E651D-2EB9-41E6-A8CE-F0F6773F4CF5}"/>
+                <a16:creationId xmlns="" xmlns:a16="http://schemas.microsoft.com/office/drawing/2014/main" id="{907E651D-2EB9-41E6-A8CE-F0F6773F4CF5}"/>
               </a:ext>
             </a:extLst>
           </p:cNvPr>
@@ -5276,7 +5276,7 @@
           <p:cNvPr id="68" name="CuadroTexto 67">
             <a:extLst>
               <a:ext uri="{FF2B5EF4-FFF2-40B4-BE49-F238E27FC236}">
-                <a16:creationId xmlns:a16="http://schemas.microsoft.com/office/drawing/2014/main" xmlns="" id="{DD8BDEF3-D2D0-420D-8702-1234C032BE2E}"/>
+                <a16:creationId xmlns="" xmlns:a16="http://schemas.microsoft.com/office/drawing/2014/main" id="{DD8BDEF3-D2D0-420D-8702-1234C032BE2E}"/>
               </a:ext>
             </a:extLst>
           </p:cNvPr>
@@ -5318,7 +5318,7 @@
           <p:cNvPr id="69" name="CuadroTexto 68">
             <a:extLst>
               <a:ext uri="{FF2B5EF4-FFF2-40B4-BE49-F238E27FC236}">
-                <a16:creationId xmlns:a16="http://schemas.microsoft.com/office/drawing/2014/main" xmlns="" id="{96235787-AC3F-4707-9CB3-46462DAD72D5}"/>
+                <a16:creationId xmlns="" xmlns:a16="http://schemas.microsoft.com/office/drawing/2014/main" id="{96235787-AC3F-4707-9CB3-46462DAD72D5}"/>
               </a:ext>
             </a:extLst>
           </p:cNvPr>
@@ -5360,7 +5360,7 @@
           <p:cNvPr id="70" name="CuadroTexto 69">
             <a:extLst>
               <a:ext uri="{FF2B5EF4-FFF2-40B4-BE49-F238E27FC236}">
-                <a16:creationId xmlns:a16="http://schemas.microsoft.com/office/drawing/2014/main" xmlns="" id="{D12EAE3C-AD77-4DB5-B389-425E3BA162AC}"/>
+                <a16:creationId xmlns="" xmlns:a16="http://schemas.microsoft.com/office/drawing/2014/main" id="{D12EAE3C-AD77-4DB5-B389-425E3BA162AC}"/>
               </a:ext>
             </a:extLst>
           </p:cNvPr>
@@ -5402,7 +5402,7 @@
           <p:cNvPr id="71" name="CuadroTexto 70">
             <a:extLst>
               <a:ext uri="{FF2B5EF4-FFF2-40B4-BE49-F238E27FC236}">
-                <a16:creationId xmlns:a16="http://schemas.microsoft.com/office/drawing/2014/main" xmlns="" id="{B8A3BECE-72B7-4896-89D4-54E79464A23A}"/>
+                <a16:creationId xmlns="" xmlns:a16="http://schemas.microsoft.com/office/drawing/2014/main" id="{B8A3BECE-72B7-4896-89D4-54E79464A23A}"/>
               </a:ext>
             </a:extLst>
           </p:cNvPr>
@@ -5444,7 +5444,7 @@
           <p:cNvPr id="72" name="Conector recto de flecha 71">
             <a:extLst>
               <a:ext uri="{FF2B5EF4-FFF2-40B4-BE49-F238E27FC236}">
-                <a16:creationId xmlns:a16="http://schemas.microsoft.com/office/drawing/2014/main" xmlns="" id="{D22BEA63-9433-4657-A683-C1260E8B1409}"/>
+                <a16:creationId xmlns="" xmlns:a16="http://schemas.microsoft.com/office/drawing/2014/main" id="{D22BEA63-9433-4657-A683-C1260E8B1409}"/>
               </a:ext>
             </a:extLst>
           </p:cNvPr>
@@ -5486,7 +5486,7 @@
           <p:cNvPr id="3072" name="CuadroTexto 3071">
             <a:extLst>
               <a:ext uri="{FF2B5EF4-FFF2-40B4-BE49-F238E27FC236}">
-                <a16:creationId xmlns:a16="http://schemas.microsoft.com/office/drawing/2014/main" xmlns="" id="{476D5052-B8B6-41A8-9FB4-1289C7E42331}"/>
+                <a16:creationId xmlns="" xmlns:a16="http://schemas.microsoft.com/office/drawing/2014/main" id="{476D5052-B8B6-41A8-9FB4-1289C7E42331}"/>
               </a:ext>
             </a:extLst>
           </p:cNvPr>
@@ -5761,7 +5761,7 @@
           <p:cNvPr id="76" name="CuadroTexto 35">
             <a:extLst>
               <a:ext uri="{FF2B5EF4-FFF2-40B4-BE49-F238E27FC236}">
-                <a16:creationId xmlns:a16="http://schemas.microsoft.com/office/drawing/2014/main" xmlns="" id="{94E623A8-BF5E-464F-BD23-B945E7EA7406}"/>
+                <a16:creationId xmlns="" xmlns:a16="http://schemas.microsoft.com/office/drawing/2014/main" id="{94E623A8-BF5E-464F-BD23-B945E7EA7406}"/>
               </a:ext>
             </a:extLst>
           </p:cNvPr>
@@ -5803,7 +5803,7 @@
           <p:cNvPr id="77" name="CuadroTexto 36">
             <a:extLst>
               <a:ext uri="{FF2B5EF4-FFF2-40B4-BE49-F238E27FC236}">
-                <a16:creationId xmlns:a16="http://schemas.microsoft.com/office/drawing/2014/main" xmlns="" id="{7961C6B0-0BA2-45AC-A9FE-2FC0966D5F6A}"/>
+                <a16:creationId xmlns="" xmlns:a16="http://schemas.microsoft.com/office/drawing/2014/main" id="{7961C6B0-0BA2-45AC-A9FE-2FC0966D5F6A}"/>
               </a:ext>
             </a:extLst>
           </p:cNvPr>
@@ -5845,7 +5845,7 @@
           <p:cNvPr id="78" name="CuadroTexto 37">
             <a:extLst>
               <a:ext uri="{FF2B5EF4-FFF2-40B4-BE49-F238E27FC236}">
-                <a16:creationId xmlns:a16="http://schemas.microsoft.com/office/drawing/2014/main" xmlns="" id="{9158EB16-FDDD-4921-ACE1-A6C2B6F87586}"/>
+                <a16:creationId xmlns="" xmlns:a16="http://schemas.microsoft.com/office/drawing/2014/main" id="{9158EB16-FDDD-4921-ACE1-A6C2B6F87586}"/>
               </a:ext>
             </a:extLst>
           </p:cNvPr>
@@ -5887,7 +5887,7 @@
           <p:cNvPr id="79" name="CuadroTexto 35">
             <a:extLst>
               <a:ext uri="{FF2B5EF4-FFF2-40B4-BE49-F238E27FC236}">
-                <a16:creationId xmlns:a16="http://schemas.microsoft.com/office/drawing/2014/main" xmlns="" id="{94E623A8-BF5E-464F-BD23-B945E7EA7406}"/>
+                <a16:creationId xmlns="" xmlns:a16="http://schemas.microsoft.com/office/drawing/2014/main" id="{94E623A8-BF5E-464F-BD23-B945E7EA7406}"/>
               </a:ext>
             </a:extLst>
           </p:cNvPr>
@@ -5929,7 +5929,7 @@
           <p:cNvPr id="80" name="CuadroTexto 36">
             <a:extLst>
               <a:ext uri="{FF2B5EF4-FFF2-40B4-BE49-F238E27FC236}">
-                <a16:creationId xmlns:a16="http://schemas.microsoft.com/office/drawing/2014/main" xmlns="" id="{7961C6B0-0BA2-45AC-A9FE-2FC0966D5F6A}"/>
+                <a16:creationId xmlns="" xmlns:a16="http://schemas.microsoft.com/office/drawing/2014/main" id="{7961C6B0-0BA2-45AC-A9FE-2FC0966D5F6A}"/>
               </a:ext>
             </a:extLst>
           </p:cNvPr>
@@ -5971,7 +5971,7 @@
           <p:cNvPr id="81" name="CuadroTexto 37">
             <a:extLst>
               <a:ext uri="{FF2B5EF4-FFF2-40B4-BE49-F238E27FC236}">
-                <a16:creationId xmlns:a16="http://schemas.microsoft.com/office/drawing/2014/main" xmlns="" id="{9158EB16-FDDD-4921-ACE1-A6C2B6F87586}"/>
+                <a16:creationId xmlns="" xmlns:a16="http://schemas.microsoft.com/office/drawing/2014/main" id="{9158EB16-FDDD-4921-ACE1-A6C2B6F87586}"/>
               </a:ext>
             </a:extLst>
           </p:cNvPr>

</xml_diff>